<commit_message>
Grafica comunicacion y score listas
</commit_message>
<xml_diff>
--- a/12-16-18-23-27-sept-2019/Analysis/Colaboración, uso del lenguaje y comprensión.pptx
+++ b/12-16-18-23-27-sept-2019/Analysis/Colaboración, uso del lenguaje y comprensión.pptx
@@ -14,10 +14,12 @@
     <p:sldId id="262" r:id="rId8"/>
     <p:sldId id="263" r:id="rId9"/>
     <p:sldId id="264" r:id="rId10"/>
-    <p:sldId id="265" r:id="rId11"/>
-    <p:sldId id="266" r:id="rId12"/>
-    <p:sldId id="268" r:id="rId13"/>
-    <p:sldId id="267" r:id="rId14"/>
+    <p:sldId id="269" r:id="rId11"/>
+    <p:sldId id="270" r:id="rId12"/>
+    <p:sldId id="265" r:id="rId13"/>
+    <p:sldId id="266" r:id="rId14"/>
+    <p:sldId id="268" r:id="rId15"/>
+    <p:sldId id="267" r:id="rId16"/>
   </p:sldIdLst>
   <p:sldSz cx="12192000" cy="6858000"/>
   <p:notesSz cx="6858000" cy="9144000"/>
@@ -255,7 +257,7 @@
           <a:p>
             <a:fld id="{7A7858B5-3D53-4E9C-A8C8-DB087F1FBF2D}" type="datetimeFigureOut">
               <a:rPr lang="es-CO" smtClean="0"/>
-              <a:t>15/01/2020</a:t>
+              <a:t>21/01/2020</a:t>
             </a:fld>
             <a:endParaRPr lang="es-CO"/>
           </a:p>
@@ -425,7 +427,7 @@
           <a:p>
             <a:fld id="{7A7858B5-3D53-4E9C-A8C8-DB087F1FBF2D}" type="datetimeFigureOut">
               <a:rPr lang="es-CO" smtClean="0"/>
-              <a:t>15/01/2020</a:t>
+              <a:t>21/01/2020</a:t>
             </a:fld>
             <a:endParaRPr lang="es-CO"/>
           </a:p>
@@ -605,7 +607,7 @@
           <a:p>
             <a:fld id="{7A7858B5-3D53-4E9C-A8C8-DB087F1FBF2D}" type="datetimeFigureOut">
               <a:rPr lang="es-CO" smtClean="0"/>
-              <a:t>15/01/2020</a:t>
+              <a:t>21/01/2020</a:t>
             </a:fld>
             <a:endParaRPr lang="es-CO"/>
           </a:p>
@@ -775,7 +777,7 @@
           <a:p>
             <a:fld id="{7A7858B5-3D53-4E9C-A8C8-DB087F1FBF2D}" type="datetimeFigureOut">
               <a:rPr lang="es-CO" smtClean="0"/>
-              <a:t>15/01/2020</a:t>
+              <a:t>21/01/2020</a:t>
             </a:fld>
             <a:endParaRPr lang="es-CO"/>
           </a:p>
@@ -1021,7 +1023,7 @@
           <a:p>
             <a:fld id="{7A7858B5-3D53-4E9C-A8C8-DB087F1FBF2D}" type="datetimeFigureOut">
               <a:rPr lang="es-CO" smtClean="0"/>
-              <a:t>15/01/2020</a:t>
+              <a:t>21/01/2020</a:t>
             </a:fld>
             <a:endParaRPr lang="es-CO"/>
           </a:p>
@@ -1253,7 +1255,7 @@
           <a:p>
             <a:fld id="{7A7858B5-3D53-4E9C-A8C8-DB087F1FBF2D}" type="datetimeFigureOut">
               <a:rPr lang="es-CO" smtClean="0"/>
-              <a:t>15/01/2020</a:t>
+              <a:t>21/01/2020</a:t>
             </a:fld>
             <a:endParaRPr lang="es-CO"/>
           </a:p>
@@ -1620,7 +1622,7 @@
           <a:p>
             <a:fld id="{7A7858B5-3D53-4E9C-A8C8-DB087F1FBF2D}" type="datetimeFigureOut">
               <a:rPr lang="es-CO" smtClean="0"/>
-              <a:t>15/01/2020</a:t>
+              <a:t>21/01/2020</a:t>
             </a:fld>
             <a:endParaRPr lang="es-CO"/>
           </a:p>
@@ -1738,7 +1740,7 @@
           <a:p>
             <a:fld id="{7A7858B5-3D53-4E9C-A8C8-DB087F1FBF2D}" type="datetimeFigureOut">
               <a:rPr lang="es-CO" smtClean="0"/>
-              <a:t>15/01/2020</a:t>
+              <a:t>21/01/2020</a:t>
             </a:fld>
             <a:endParaRPr lang="es-CO"/>
           </a:p>
@@ -1833,7 +1835,7 @@
           <a:p>
             <a:fld id="{7A7858B5-3D53-4E9C-A8C8-DB087F1FBF2D}" type="datetimeFigureOut">
               <a:rPr lang="es-CO" smtClean="0"/>
-              <a:t>15/01/2020</a:t>
+              <a:t>21/01/2020</a:t>
             </a:fld>
             <a:endParaRPr lang="es-CO"/>
           </a:p>
@@ -2110,7 +2112,7 @@
           <a:p>
             <a:fld id="{7A7858B5-3D53-4E9C-A8C8-DB087F1FBF2D}" type="datetimeFigureOut">
               <a:rPr lang="es-CO" smtClean="0"/>
-              <a:t>15/01/2020</a:t>
+              <a:t>21/01/2020</a:t>
             </a:fld>
             <a:endParaRPr lang="es-CO"/>
           </a:p>
@@ -2363,7 +2365,7 @@
           <a:p>
             <a:fld id="{7A7858B5-3D53-4E9C-A8C8-DB087F1FBF2D}" type="datetimeFigureOut">
               <a:rPr lang="es-CO" smtClean="0"/>
-              <a:t>15/01/2020</a:t>
+              <a:t>21/01/2020</a:t>
             </a:fld>
             <a:endParaRPr lang="es-CO"/>
           </a:p>
@@ -2576,7 +2578,7 @@
           <a:p>
             <a:fld id="{7A7858B5-3D53-4E9C-A8C8-DB087F1FBF2D}" type="datetimeFigureOut">
               <a:rPr lang="es-CO" smtClean="0"/>
-              <a:t>15/01/2020</a:t>
+              <a:t>21/01/2020</a:t>
             </a:fld>
             <a:endParaRPr lang="es-CO"/>
           </a:p>
@@ -3070,6 +3072,304 @@
           <a:p>
             <a:r>
               <a:rPr lang="es-CO" dirty="0" smtClean="0"/>
+              <a:t>Score in </a:t>
+            </a:r>
+            <a:r>
+              <a:rPr lang="es-CO" dirty="0" err="1" smtClean="0"/>
+              <a:t>game</a:t>
+            </a:r>
+            <a:r>
+              <a:rPr lang="es-CO" dirty="0" smtClean="0"/>
+              <a:t> rounds</a:t>
+            </a:r>
+            <a:endParaRPr lang="es-CO" dirty="0"/>
+          </a:p>
+        </p:txBody>
+      </p:sp>
+      <p:pic>
+        <p:nvPicPr>
+          <p:cNvPr id="3" name="Imagen 2"/>
+          <p:cNvPicPr>
+            <a:picLocks noChangeAspect="1"/>
+          </p:cNvPicPr>
+          <p:nvPr/>
+        </p:nvPicPr>
+        <p:blipFill>
+          <a:blip r:embed="rId2"/>
+          <a:stretch>
+            <a:fillRect/>
+          </a:stretch>
+        </p:blipFill>
+        <p:spPr>
+          <a:xfrm>
+            <a:off x="1705232" y="1441183"/>
+            <a:ext cx="7718853" cy="3855747"/>
+          </a:xfrm>
+          <a:prstGeom prst="rect">
+            <a:avLst/>
+          </a:prstGeom>
+        </p:spPr>
+      </p:pic>
+      <p:sp>
+        <p:nvSpPr>
+          <p:cNvPr id="7" name="CuadroTexto 6"/>
+          <p:cNvSpPr txBox="1"/>
+          <p:nvPr/>
+        </p:nvSpPr>
+        <p:spPr>
+          <a:xfrm>
+            <a:off x="1482811" y="5782962"/>
+            <a:ext cx="7625934" cy="646331"/>
+          </a:xfrm>
+          <a:prstGeom prst="rect">
+            <a:avLst/>
+          </a:prstGeom>
+          <a:noFill/>
+        </p:spPr>
+        <p:txBody>
+          <a:bodyPr wrap="none" rtlCol="0">
+            <a:spAutoFit/>
+          </a:bodyPr>
+          <a:lstStyle/>
+          <a:p>
+            <a:pPr marL="285750" indent="-285750">
+              <a:buFont typeface="Arial" panose="020B0604020202020204" pitchFamily="34" charset="0"/>
+              <a:buChar char="•"/>
+            </a:pPr>
+            <a:r>
+              <a:rPr lang="es-CO" dirty="0" smtClean="0"/>
+              <a:t>No se observa diferencia significativa respecto a los grupos y a los individuos</a:t>
+            </a:r>
+          </a:p>
+          <a:p>
+            <a:pPr marL="285750" indent="-285750">
+              <a:buFont typeface="Arial" panose="020B0604020202020204" pitchFamily="34" charset="0"/>
+              <a:buChar char="•"/>
+            </a:pPr>
+            <a:r>
+              <a:rPr lang="es-CO" dirty="0"/>
+              <a:t>No se observa diferencia </a:t>
+            </a:r>
+            <a:r>
+              <a:rPr lang="es-CO" dirty="0" smtClean="0"/>
+              <a:t>significativa respecto a los </a:t>
+            </a:r>
+            <a:r>
+              <a:rPr lang="es-CO" dirty="0" err="1" smtClean="0"/>
+              <a:t>hounds</a:t>
+            </a:r>
+            <a:r>
+              <a:rPr lang="es-CO" dirty="0" smtClean="0"/>
+              <a:t> y a los </a:t>
+            </a:r>
+            <a:r>
+              <a:rPr lang="es-CO" dirty="0" err="1" smtClean="0"/>
+              <a:t>terriers</a:t>
+            </a:r>
+            <a:endParaRPr lang="es-CO" dirty="0"/>
+          </a:p>
+        </p:txBody>
+      </p:sp>
+    </p:spTree>
+    <p:extLst>
+      <p:ext uri="{BB962C8B-B14F-4D97-AF65-F5344CB8AC3E}">
+        <p14:creationId xmlns:p14="http://schemas.microsoft.com/office/powerpoint/2010/main" val="43718161"/>
+      </p:ext>
+    </p:extLst>
+  </p:cSld>
+  <p:clrMapOvr>
+    <a:masterClrMapping/>
+  </p:clrMapOvr>
+</p:sld>
+</file>
+
+<file path=ppt/slides/slide11.xml><?xml version="1.0" encoding="utf-8"?>
+<p:sld xmlns:a="http://schemas.openxmlformats.org/drawingml/2006/main" xmlns:r="http://schemas.openxmlformats.org/officeDocument/2006/relationships" xmlns:p="http://schemas.openxmlformats.org/presentationml/2006/main">
+  <p:cSld>
+    <p:spTree>
+      <p:nvGrpSpPr>
+        <p:cNvPr id="1" name=""/>
+        <p:cNvGrpSpPr/>
+        <p:nvPr/>
+      </p:nvGrpSpPr>
+      <p:grpSpPr>
+        <a:xfrm>
+          <a:off x="0" y="0"/>
+          <a:ext cx="0" cy="0"/>
+          <a:chOff x="0" y="0"/>
+          <a:chExt cx="0" cy="0"/>
+        </a:xfrm>
+      </p:grpSpPr>
+      <p:sp>
+        <p:nvSpPr>
+          <p:cNvPr id="2" name="Título 1"/>
+          <p:cNvSpPr>
+            <a:spLocks noGrp="1"/>
+          </p:cNvSpPr>
+          <p:nvPr>
+            <p:ph type="title"/>
+          </p:nvPr>
+        </p:nvSpPr>
+        <p:spPr/>
+        <p:txBody>
+          <a:bodyPr/>
+          <a:lstStyle/>
+          <a:p>
+            <a:r>
+              <a:rPr lang="es-CO" dirty="0" err="1" smtClean="0"/>
+              <a:t>Number</a:t>
+            </a:r>
+            <a:r>
+              <a:rPr lang="es-CO" dirty="0" smtClean="0"/>
+              <a:t> of </a:t>
+            </a:r>
+            <a:r>
+              <a:rPr lang="es-CO" dirty="0" err="1" smtClean="0"/>
+              <a:t>messages</a:t>
+            </a:r>
+            <a:r>
+              <a:rPr lang="es-CO" dirty="0" smtClean="0"/>
+              <a:t> per round</a:t>
+            </a:r>
+            <a:endParaRPr lang="es-CO" dirty="0"/>
+          </a:p>
+        </p:txBody>
+      </p:sp>
+      <p:sp>
+        <p:nvSpPr>
+          <p:cNvPr id="7" name="CuadroTexto 6"/>
+          <p:cNvSpPr txBox="1"/>
+          <p:nvPr/>
+        </p:nvSpPr>
+        <p:spPr>
+          <a:xfrm>
+            <a:off x="1482811" y="5782962"/>
+            <a:ext cx="9202456" cy="646331"/>
+          </a:xfrm>
+          <a:prstGeom prst="rect">
+            <a:avLst/>
+          </a:prstGeom>
+          <a:noFill/>
+        </p:spPr>
+        <p:txBody>
+          <a:bodyPr wrap="none" rtlCol="0">
+            <a:spAutoFit/>
+          </a:bodyPr>
+          <a:lstStyle/>
+          <a:p>
+            <a:pPr marL="285750" indent="-285750">
+              <a:buFont typeface="Arial" panose="020B0604020202020204" pitchFamily="34" charset="0"/>
+              <a:buChar char="•"/>
+            </a:pPr>
+            <a:r>
+              <a:rPr lang="es-CO" dirty="0" smtClean="0"/>
+              <a:t>La comunicación promedio disminuye muy poco y termina alrededor de 1 mensaje por ronda</a:t>
+            </a:r>
+          </a:p>
+          <a:p>
+            <a:pPr marL="285750" indent="-285750">
+              <a:buFont typeface="Arial" panose="020B0604020202020204" pitchFamily="34" charset="0"/>
+              <a:buChar char="•"/>
+            </a:pPr>
+            <a:r>
+              <a:rPr lang="es-CO" dirty="0" smtClean="0"/>
+              <a:t>No </a:t>
+            </a:r>
+            <a:r>
+              <a:rPr lang="es-CO" dirty="0"/>
+              <a:t>se observa diferencia </a:t>
+            </a:r>
+            <a:r>
+              <a:rPr lang="es-CO" dirty="0" smtClean="0"/>
+              <a:t>significativa respecto a los </a:t>
+            </a:r>
+            <a:r>
+              <a:rPr lang="es-CO" dirty="0" err="1" smtClean="0"/>
+              <a:t>hounds</a:t>
+            </a:r>
+            <a:r>
+              <a:rPr lang="es-CO" dirty="0" smtClean="0"/>
+              <a:t> y a los </a:t>
+            </a:r>
+            <a:r>
+              <a:rPr lang="es-CO" dirty="0" err="1" smtClean="0"/>
+              <a:t>terriers</a:t>
+            </a:r>
+            <a:endParaRPr lang="es-CO" dirty="0"/>
+          </a:p>
+        </p:txBody>
+      </p:sp>
+      <p:pic>
+        <p:nvPicPr>
+          <p:cNvPr id="5" name="Imagen 4"/>
+          <p:cNvPicPr>
+            <a:picLocks noChangeAspect="1"/>
+          </p:cNvPicPr>
+          <p:nvPr/>
+        </p:nvPicPr>
+        <p:blipFill>
+          <a:blip r:embed="rId2"/>
+          <a:stretch>
+            <a:fillRect/>
+          </a:stretch>
+        </p:blipFill>
+        <p:spPr>
+          <a:xfrm>
+            <a:off x="2597286" y="1550473"/>
+            <a:ext cx="5920638" cy="4232489"/>
+          </a:xfrm>
+          <a:prstGeom prst="rect">
+            <a:avLst/>
+          </a:prstGeom>
+        </p:spPr>
+      </p:pic>
+    </p:spTree>
+    <p:extLst>
+      <p:ext uri="{BB962C8B-B14F-4D97-AF65-F5344CB8AC3E}">
+        <p14:creationId xmlns:p14="http://schemas.microsoft.com/office/powerpoint/2010/main" val="211567745"/>
+      </p:ext>
+    </p:extLst>
+  </p:cSld>
+  <p:clrMapOvr>
+    <a:masterClrMapping/>
+  </p:clrMapOvr>
+</p:sld>
+</file>
+
+<file path=ppt/slides/slide12.xml><?xml version="1.0" encoding="utf-8"?>
+<p:sld xmlns:a="http://schemas.openxmlformats.org/drawingml/2006/main" xmlns:r="http://schemas.openxmlformats.org/officeDocument/2006/relationships" xmlns:p="http://schemas.openxmlformats.org/presentationml/2006/main">
+  <p:cSld>
+    <p:spTree>
+      <p:nvGrpSpPr>
+        <p:cNvPr id="1" name=""/>
+        <p:cNvGrpSpPr/>
+        <p:nvPr/>
+      </p:nvGrpSpPr>
+      <p:grpSpPr>
+        <a:xfrm>
+          <a:off x="0" y="0"/>
+          <a:ext cx="0" cy="0"/>
+          <a:chOff x="0" y="0"/>
+          <a:chExt cx="0" cy="0"/>
+        </a:xfrm>
+      </p:grpSpPr>
+      <p:sp>
+        <p:nvSpPr>
+          <p:cNvPr id="2" name="Título 1"/>
+          <p:cNvSpPr>
+            <a:spLocks noGrp="1"/>
+          </p:cNvSpPr>
+          <p:nvPr>
+            <p:ph type="title"/>
+          </p:nvPr>
+        </p:nvSpPr>
+        <p:spPr/>
+        <p:txBody>
+          <a:bodyPr/>
+          <a:lstStyle/>
+          <a:p>
+            <a:r>
+              <a:rPr lang="es-CO" dirty="0" smtClean="0"/>
               <a:t>Algunos resultados (2/3)</a:t>
             </a:r>
             <a:endParaRPr lang="es-CO" dirty="0"/>
@@ -3113,7 +3413,7 @@
 </p:sld>
 </file>
 
-<file path=ppt/slides/slide11.xml><?xml version="1.0" encoding="utf-8"?>
+<file path=ppt/slides/slide13.xml><?xml version="1.0" encoding="utf-8"?>
 <p:sld xmlns:a="http://schemas.openxmlformats.org/drawingml/2006/main" xmlns:r="http://schemas.openxmlformats.org/officeDocument/2006/relationships" xmlns:p="http://schemas.openxmlformats.org/presentationml/2006/main">
   <p:cSld>
     <p:spTree>
@@ -3190,7 +3490,7 @@
 </p:sld>
 </file>
 
-<file path=ppt/slides/slide12.xml><?xml version="1.0" encoding="utf-8"?>
+<file path=ppt/slides/slide14.xml><?xml version="1.0" encoding="utf-8"?>
 <p:sld xmlns:a="http://schemas.openxmlformats.org/drawingml/2006/main" xmlns:r="http://schemas.openxmlformats.org/officeDocument/2006/relationships" xmlns:p="http://schemas.openxmlformats.org/presentationml/2006/main">
   <p:cSld>
     <p:spTree>
@@ -3280,7 +3580,7 @@
 </p:sld>
 </file>
 
-<file path=ppt/slides/slide13.xml><?xml version="1.0" encoding="utf-8"?>
+<file path=ppt/slides/slide15.xml><?xml version="1.0" encoding="utf-8"?>
 <p:sld xmlns:a="http://schemas.openxmlformats.org/drawingml/2006/main" xmlns:r="http://schemas.openxmlformats.org/officeDocument/2006/relationships" xmlns:p="http://schemas.openxmlformats.org/presentationml/2006/main">
   <p:cSld>
     <p:spTree>
@@ -3339,11 +3639,7 @@
           <a:p>
             <a:r>
               <a:rPr lang="es-CO" dirty="0" smtClean="0"/>
-              <a:t>Gráficas </a:t>
-            </a:r>
-            <a:r>
-              <a:rPr lang="es-CO" dirty="0" smtClean="0"/>
-              <a:t>de desempeño separando </a:t>
+              <a:t>Gráficas de desempeño separando </a:t>
             </a:r>
             <a:r>
               <a:rPr lang="es-CO" dirty="0" err="1" smtClean="0"/>
@@ -3357,32 +3653,28 @@
               <a:rPr lang="es-CO" dirty="0" err="1" smtClean="0"/>
               <a:t>Hounds</a:t>
             </a:r>
+            <a:r>
+              <a:rPr lang="es-CO" dirty="0" smtClean="0"/>
+              <a:t> =&gt; OK</a:t>
+            </a:r>
             <a:endParaRPr lang="es-CO" dirty="0"/>
           </a:p>
           <a:p>
-            <a:pPr lvl="1"/>
-            <a:r>
-              <a:rPr lang="es-CO" dirty="0" smtClean="0"/>
-              <a:t>Ya están las tablas, pero hay que combinarlas =&gt; </a:t>
-            </a:r>
-            <a:r>
-              <a:rPr lang="es-CO" dirty="0" err="1" smtClean="0"/>
-              <a:t>Ezzzgar</a:t>
-            </a:r>
-            <a:endParaRPr lang="es-CO" dirty="0" smtClean="0"/>
-          </a:p>
-          <a:p>
-            <a:r>
-              <a:rPr lang="es-CO" dirty="0" smtClean="0"/>
-              <a:t>Graficar el número de mensajes por ronda, agregado y también de acuerdo a </a:t>
-            </a:r>
-            <a:r>
-              <a:rPr lang="es-CO" dirty="0" smtClean="0"/>
-              <a:t>experticia =&gt; </a:t>
-            </a:r>
-            <a:r>
-              <a:rPr lang="es-CO" dirty="0" err="1" smtClean="0"/>
-              <a:t>Ezzzgar</a:t>
+            <a:r>
+              <a:rPr lang="es-CO" dirty="0" smtClean="0"/>
+              <a:t>Graficar </a:t>
+            </a:r>
+            <a:r>
+              <a:rPr lang="es-CO" dirty="0" smtClean="0"/>
+              <a:t>el número de mensajes por ronda, agregado y también de acuerdo a experticia </a:t>
+            </a:r>
+            <a:r>
+              <a:rPr lang="es-CO" smtClean="0"/>
+              <a:t>=&gt; </a:t>
+            </a:r>
+            <a:r>
+              <a:rPr lang="es-CO" smtClean="0"/>
+              <a:t>OK</a:t>
             </a:r>
             <a:endParaRPr lang="es-CO" dirty="0" smtClean="0"/>
           </a:p>
@@ -3417,15 +3709,7 @@
           <a:p>
             <a:r>
               <a:rPr lang="es-CO" dirty="0" smtClean="0"/>
-              <a:t>Correlacionar </a:t>
-            </a:r>
-            <a:r>
-              <a:rPr lang="es-CO" dirty="0" smtClean="0"/>
-              <a:t>la comunicación correcta con el envío de </a:t>
-            </a:r>
-            <a:r>
-              <a:rPr lang="es-CO" dirty="0" smtClean="0"/>
-              <a:t>mensajes</a:t>
+              <a:t>Correlacionar la comunicación correcta con el envío de mensajes</a:t>
             </a:r>
           </a:p>
           <a:p>
@@ -3437,11 +3721,7 @@
           <a:p>
             <a:r>
               <a:rPr lang="es-CO" dirty="0" smtClean="0"/>
-              <a:t>Sacar índice de cooperación </a:t>
-            </a:r>
-            <a:r>
-              <a:rPr lang="es-CO" smtClean="0"/>
-              <a:t>=&gt; Alejandro</a:t>
+              <a:t>Sacar índice de cooperación =&gt; Alejandro</a:t>
             </a:r>
             <a:endParaRPr lang="es-CO" dirty="0"/>
           </a:p>
@@ -3670,11 +3950,7 @@
           <a:p>
             <a:r>
               <a:rPr lang="es-CO" dirty="0" smtClean="0"/>
-              <a:t>2 </a:t>
-            </a:r>
-            <a:r>
-              <a:rPr lang="es-CO" dirty="0" smtClean="0"/>
-              <a:t>tratamientos (</a:t>
+              <a:t>2 tratamientos (</a:t>
             </a:r>
             <a:r>
               <a:rPr lang="es-CO" dirty="0" err="1" smtClean="0"/>
@@ -3682,11 +3958,7 @@
             </a:r>
             <a:r>
               <a:rPr lang="es-CO" dirty="0" smtClean="0"/>
-              <a:t>): </a:t>
-            </a:r>
-            <a:r>
-              <a:rPr lang="es-CO" dirty="0" smtClean="0"/>
-              <a:t>individual y por parejas</a:t>
+              <a:t>): individual y por parejas</a:t>
             </a:r>
           </a:p>
           <a:p>
@@ -4434,7 +4706,7 @@
           <a:p>
             <a:r>
               <a:rPr lang="es-CO" dirty="0" smtClean="0"/>
-              <a:t>Algunos resultados (1/3)</a:t>
+              <a:t>Score in training rounds</a:t>
             </a:r>
             <a:endParaRPr lang="es-CO" dirty="0"/>
           </a:p>
@@ -4442,7 +4714,7 @@
       </p:sp>
       <p:pic>
         <p:nvPicPr>
-          <p:cNvPr id="6" name="Imagen 5"/>
+          <p:cNvPr id="3" name="Imagen 2"/>
           <p:cNvPicPr>
             <a:picLocks noChangeAspect="1"/>
           </p:cNvPicPr>
@@ -4456,14 +4728,74 @@
         </p:blipFill>
         <p:spPr>
           <a:xfrm>
-            <a:off x="1039965" y="1594966"/>
-            <a:ext cx="9304762" cy="5000000"/>
+            <a:off x="1680517" y="1395549"/>
+            <a:ext cx="7776521" cy="3884553"/>
           </a:xfrm>
           <a:prstGeom prst="rect">
             <a:avLst/>
           </a:prstGeom>
         </p:spPr>
       </p:pic>
+      <p:sp>
+        <p:nvSpPr>
+          <p:cNvPr id="4" name="CuadroTexto 3"/>
+          <p:cNvSpPr txBox="1"/>
+          <p:nvPr/>
+        </p:nvSpPr>
+        <p:spPr>
+          <a:xfrm>
+            <a:off x="1482811" y="5782962"/>
+            <a:ext cx="7625934" cy="646331"/>
+          </a:xfrm>
+          <a:prstGeom prst="rect">
+            <a:avLst/>
+          </a:prstGeom>
+          <a:noFill/>
+        </p:spPr>
+        <p:txBody>
+          <a:bodyPr wrap="none" rtlCol="0">
+            <a:spAutoFit/>
+          </a:bodyPr>
+          <a:lstStyle/>
+          <a:p>
+            <a:pPr marL="285750" indent="-285750">
+              <a:buFont typeface="Arial" panose="020B0604020202020204" pitchFamily="34" charset="0"/>
+              <a:buChar char="•"/>
+            </a:pPr>
+            <a:r>
+              <a:rPr lang="es-CO" dirty="0" smtClean="0"/>
+              <a:t>No se observa diferencia significativa respecto a los grupos y a los individuos</a:t>
+            </a:r>
+          </a:p>
+          <a:p>
+            <a:pPr marL="285750" indent="-285750">
+              <a:buFont typeface="Arial" panose="020B0604020202020204" pitchFamily="34" charset="0"/>
+              <a:buChar char="•"/>
+            </a:pPr>
+            <a:r>
+              <a:rPr lang="es-CO" dirty="0"/>
+              <a:t>No se observa diferencia </a:t>
+            </a:r>
+            <a:r>
+              <a:rPr lang="es-CO" dirty="0" smtClean="0"/>
+              <a:t>significativa respecto a los </a:t>
+            </a:r>
+            <a:r>
+              <a:rPr lang="es-CO" dirty="0" err="1" smtClean="0"/>
+              <a:t>hounds</a:t>
+            </a:r>
+            <a:r>
+              <a:rPr lang="es-CO" dirty="0" smtClean="0"/>
+              <a:t> y a los </a:t>
+            </a:r>
+            <a:r>
+              <a:rPr lang="es-CO" dirty="0" err="1" smtClean="0"/>
+              <a:t>terriers</a:t>
+            </a:r>
+            <a:endParaRPr lang="es-CO" dirty="0"/>
+          </a:p>
+        </p:txBody>
+      </p:sp>
     </p:spTree>
     <p:extLst>
       <p:ext uri="{BB962C8B-B14F-4D97-AF65-F5344CB8AC3E}">

</xml_diff>

<commit_message>
Correcciones a base de datos comunicacion
</commit_message>
<xml_diff>
--- a/12-16-18-23-27-sept-2019/Analysis/Colaboración, uso del lenguaje y comprensión.pptx
+++ b/12-16-18-23-27-sept-2019/Analysis/Colaboración, uso del lenguaje y comprensión.pptx
@@ -13,8 +13,8 @@
     <p:sldId id="261" r:id="rId7"/>
     <p:sldId id="262" r:id="rId8"/>
     <p:sldId id="263" r:id="rId9"/>
-    <p:sldId id="264" r:id="rId10"/>
-    <p:sldId id="269" r:id="rId11"/>
+    <p:sldId id="271" r:id="rId10"/>
+    <p:sldId id="272" r:id="rId11"/>
     <p:sldId id="270" r:id="rId12"/>
     <p:sldId id="265" r:id="rId13"/>
     <p:sldId id="266" r:id="rId14"/>
@@ -257,7 +257,7 @@
           <a:p>
             <a:fld id="{7A7858B5-3D53-4E9C-A8C8-DB087F1FBF2D}" type="datetimeFigureOut">
               <a:rPr lang="es-CO" smtClean="0"/>
-              <a:t>21/01/2020</a:t>
+              <a:t>22/01/2020</a:t>
             </a:fld>
             <a:endParaRPr lang="es-CO"/>
           </a:p>
@@ -427,7 +427,7 @@
           <a:p>
             <a:fld id="{7A7858B5-3D53-4E9C-A8C8-DB087F1FBF2D}" type="datetimeFigureOut">
               <a:rPr lang="es-CO" smtClean="0"/>
-              <a:t>21/01/2020</a:t>
+              <a:t>22/01/2020</a:t>
             </a:fld>
             <a:endParaRPr lang="es-CO"/>
           </a:p>
@@ -607,7 +607,7 @@
           <a:p>
             <a:fld id="{7A7858B5-3D53-4E9C-A8C8-DB087F1FBF2D}" type="datetimeFigureOut">
               <a:rPr lang="es-CO" smtClean="0"/>
-              <a:t>21/01/2020</a:t>
+              <a:t>22/01/2020</a:t>
             </a:fld>
             <a:endParaRPr lang="es-CO"/>
           </a:p>
@@ -777,7 +777,7 @@
           <a:p>
             <a:fld id="{7A7858B5-3D53-4E9C-A8C8-DB087F1FBF2D}" type="datetimeFigureOut">
               <a:rPr lang="es-CO" smtClean="0"/>
-              <a:t>21/01/2020</a:t>
+              <a:t>22/01/2020</a:t>
             </a:fld>
             <a:endParaRPr lang="es-CO"/>
           </a:p>
@@ -1023,7 +1023,7 @@
           <a:p>
             <a:fld id="{7A7858B5-3D53-4E9C-A8C8-DB087F1FBF2D}" type="datetimeFigureOut">
               <a:rPr lang="es-CO" smtClean="0"/>
-              <a:t>21/01/2020</a:t>
+              <a:t>22/01/2020</a:t>
             </a:fld>
             <a:endParaRPr lang="es-CO"/>
           </a:p>
@@ -1255,7 +1255,7 @@
           <a:p>
             <a:fld id="{7A7858B5-3D53-4E9C-A8C8-DB087F1FBF2D}" type="datetimeFigureOut">
               <a:rPr lang="es-CO" smtClean="0"/>
-              <a:t>21/01/2020</a:t>
+              <a:t>22/01/2020</a:t>
             </a:fld>
             <a:endParaRPr lang="es-CO"/>
           </a:p>
@@ -1622,7 +1622,7 @@
           <a:p>
             <a:fld id="{7A7858B5-3D53-4E9C-A8C8-DB087F1FBF2D}" type="datetimeFigureOut">
               <a:rPr lang="es-CO" smtClean="0"/>
-              <a:t>21/01/2020</a:t>
+              <a:t>22/01/2020</a:t>
             </a:fld>
             <a:endParaRPr lang="es-CO"/>
           </a:p>
@@ -1740,7 +1740,7 @@
           <a:p>
             <a:fld id="{7A7858B5-3D53-4E9C-A8C8-DB087F1FBF2D}" type="datetimeFigureOut">
               <a:rPr lang="es-CO" smtClean="0"/>
-              <a:t>21/01/2020</a:t>
+              <a:t>22/01/2020</a:t>
             </a:fld>
             <a:endParaRPr lang="es-CO"/>
           </a:p>
@@ -1835,7 +1835,7 @@
           <a:p>
             <a:fld id="{7A7858B5-3D53-4E9C-A8C8-DB087F1FBF2D}" type="datetimeFigureOut">
               <a:rPr lang="es-CO" smtClean="0"/>
-              <a:t>21/01/2020</a:t>
+              <a:t>22/01/2020</a:t>
             </a:fld>
             <a:endParaRPr lang="es-CO"/>
           </a:p>
@@ -2112,7 +2112,7 @@
           <a:p>
             <a:fld id="{7A7858B5-3D53-4E9C-A8C8-DB087F1FBF2D}" type="datetimeFigureOut">
               <a:rPr lang="es-CO" smtClean="0"/>
-              <a:t>21/01/2020</a:t>
+              <a:t>22/01/2020</a:t>
             </a:fld>
             <a:endParaRPr lang="es-CO"/>
           </a:p>
@@ -2365,7 +2365,7 @@
           <a:p>
             <a:fld id="{7A7858B5-3D53-4E9C-A8C8-DB087F1FBF2D}" type="datetimeFigureOut">
               <a:rPr lang="es-CO" smtClean="0"/>
-              <a:t>21/01/2020</a:t>
+              <a:t>22/01/2020</a:t>
             </a:fld>
             <a:endParaRPr lang="es-CO"/>
           </a:p>
@@ -2578,7 +2578,7 @@
           <a:p>
             <a:fld id="{7A7858B5-3D53-4E9C-A8C8-DB087F1FBF2D}" type="datetimeFigureOut">
               <a:rPr lang="es-CO" smtClean="0"/>
-              <a:t>21/01/2020</a:t>
+              <a:t>22/01/2020</a:t>
             </a:fld>
             <a:endParaRPr lang="es-CO"/>
           </a:p>
@@ -3072,23 +3072,93 @@
           <a:p>
             <a:r>
               <a:rPr lang="es-CO" dirty="0" smtClean="0"/>
-              <a:t>Score in </a:t>
+              <a:t>Score per round (</a:t>
             </a:r>
             <a:r>
               <a:rPr lang="es-CO" dirty="0" err="1" smtClean="0"/>
-              <a:t>game</a:t>
-            </a:r>
-            <a:r>
-              <a:rPr lang="es-CO" dirty="0" smtClean="0"/>
-              <a:t> rounds</a:t>
+              <a:t>Game</a:t>
+            </a:r>
+            <a:r>
+              <a:rPr lang="es-CO" dirty="0" smtClean="0"/>
+              <a:t>)</a:t>
             </a:r>
             <a:endParaRPr lang="es-CO" dirty="0"/>
+          </a:p>
+        </p:txBody>
+      </p:sp>
+      <p:sp>
+        <p:nvSpPr>
+          <p:cNvPr id="7" name="CuadroTexto 6"/>
+          <p:cNvSpPr txBox="1"/>
+          <p:nvPr/>
+        </p:nvSpPr>
+        <p:spPr>
+          <a:xfrm>
+            <a:off x="1482811" y="5782962"/>
+            <a:ext cx="9902904" cy="923330"/>
+          </a:xfrm>
+          <a:prstGeom prst="rect">
+            <a:avLst/>
+          </a:prstGeom>
+          <a:noFill/>
+        </p:spPr>
+        <p:txBody>
+          <a:bodyPr wrap="none" rtlCol="0">
+            <a:spAutoFit/>
+          </a:bodyPr>
+          <a:lstStyle/>
+          <a:p>
+            <a:pPr marL="285750" indent="-285750">
+              <a:buFont typeface="Arial" panose="020B0604020202020204" pitchFamily="34" charset="0"/>
+              <a:buChar char="•"/>
+            </a:pPr>
+            <a:r>
+              <a:rPr lang="es-CO" dirty="0" smtClean="0"/>
+              <a:t>No hay diferencia entre las condiciones</a:t>
+            </a:r>
+          </a:p>
+          <a:p>
+            <a:pPr marL="285750" indent="-285750">
+              <a:buFont typeface="Arial" panose="020B0604020202020204" pitchFamily="34" charset="0"/>
+              <a:buChar char="•"/>
+            </a:pPr>
+            <a:r>
+              <a:rPr lang="es-CO" dirty="0" smtClean="0"/>
+              <a:t>No hay mucha diferencia entre las </a:t>
+            </a:r>
+            <a:r>
+              <a:rPr lang="es-CO" dirty="0" err="1" smtClean="0"/>
+              <a:t>experticies</a:t>
+            </a:r>
+            <a:r>
+              <a:rPr lang="es-CO" dirty="0" smtClean="0"/>
+              <a:t>, pero los </a:t>
+            </a:r>
+            <a:r>
+              <a:rPr lang="es-CO" dirty="0" err="1" smtClean="0"/>
+              <a:t>hound</a:t>
+            </a:r>
+            <a:r>
+              <a:rPr lang="es-CO" dirty="0" smtClean="0"/>
+              <a:t> parecen un poco mejor al comienzo</a:t>
+            </a:r>
+          </a:p>
+          <a:p>
+            <a:pPr marL="285750" indent="-285750">
+              <a:buFont typeface="Arial" panose="020B0604020202020204" pitchFamily="34" charset="0"/>
+              <a:buChar char="•"/>
+            </a:pPr>
+            <a:r>
+              <a:rPr lang="es-CO" dirty="0" smtClean="0"/>
+              <a:t>No hay diferencia entre las clases de perro</a:t>
+            </a:r>
+            <a:endParaRPr lang="es-CO" dirty="0" smtClean="0"/>
           </a:p>
         </p:txBody>
       </p:sp>
       <p:pic>
         <p:nvPicPr>
-          <p:cNvPr id="3" name="Imagen 2"/>
+          <p:cNvPr id="5" name="Imagen 4"/>
           <p:cNvPicPr>
             <a:picLocks noChangeAspect="1"/>
           </p:cNvPicPr>
@@ -3102,78 +3172,18 @@
         </p:blipFill>
         <p:spPr>
           <a:xfrm>
-            <a:off x="1705232" y="1441183"/>
-            <a:ext cx="7718853" cy="3855747"/>
+            <a:off x="453081" y="1312797"/>
+            <a:ext cx="10441760" cy="4470165"/>
           </a:xfrm>
           <a:prstGeom prst="rect">
             <a:avLst/>
           </a:prstGeom>
         </p:spPr>
       </p:pic>
-      <p:sp>
-        <p:nvSpPr>
-          <p:cNvPr id="7" name="CuadroTexto 6"/>
-          <p:cNvSpPr txBox="1"/>
-          <p:nvPr/>
-        </p:nvSpPr>
-        <p:spPr>
-          <a:xfrm>
-            <a:off x="1482811" y="5782962"/>
-            <a:ext cx="7625934" cy="646331"/>
-          </a:xfrm>
-          <a:prstGeom prst="rect">
-            <a:avLst/>
-          </a:prstGeom>
-          <a:noFill/>
-        </p:spPr>
-        <p:txBody>
-          <a:bodyPr wrap="none" rtlCol="0">
-            <a:spAutoFit/>
-          </a:bodyPr>
-          <a:lstStyle/>
-          <a:p>
-            <a:pPr marL="285750" indent="-285750">
-              <a:buFont typeface="Arial" panose="020B0604020202020204" pitchFamily="34" charset="0"/>
-              <a:buChar char="•"/>
-            </a:pPr>
-            <a:r>
-              <a:rPr lang="es-CO" dirty="0" smtClean="0"/>
-              <a:t>No se observa diferencia significativa respecto a los grupos y a los individuos</a:t>
-            </a:r>
-          </a:p>
-          <a:p>
-            <a:pPr marL="285750" indent="-285750">
-              <a:buFont typeface="Arial" panose="020B0604020202020204" pitchFamily="34" charset="0"/>
-              <a:buChar char="•"/>
-            </a:pPr>
-            <a:r>
-              <a:rPr lang="es-CO" dirty="0"/>
-              <a:t>No se observa diferencia </a:t>
-            </a:r>
-            <a:r>
-              <a:rPr lang="es-CO" dirty="0" smtClean="0"/>
-              <a:t>significativa respecto a los </a:t>
-            </a:r>
-            <a:r>
-              <a:rPr lang="es-CO" dirty="0" err="1" smtClean="0"/>
-              <a:t>hounds</a:t>
-            </a:r>
-            <a:r>
-              <a:rPr lang="es-CO" dirty="0" smtClean="0"/>
-              <a:t> y a los </a:t>
-            </a:r>
-            <a:r>
-              <a:rPr lang="es-CO" dirty="0" err="1" smtClean="0"/>
-              <a:t>terriers</a:t>
-            </a:r>
-            <a:endParaRPr lang="es-CO" dirty="0"/>
-          </a:p>
-        </p:txBody>
-      </p:sp>
     </p:spTree>
     <p:extLst>
       <p:ext uri="{BB962C8B-B14F-4D97-AF65-F5344CB8AC3E}">
-        <p14:creationId xmlns:p14="http://schemas.microsoft.com/office/powerpoint/2010/main" val="43718161"/>
+        <p14:creationId xmlns:p14="http://schemas.microsoft.com/office/powerpoint/2010/main" val="2326785754"/>
       </p:ext>
     </p:extLst>
   </p:cSld>
@@ -3662,21 +3672,8 @@
           <a:p>
             <a:r>
               <a:rPr lang="es-CO" dirty="0" smtClean="0"/>
-              <a:t>Graficar </a:t>
-            </a:r>
-            <a:r>
-              <a:rPr lang="es-CO" dirty="0" smtClean="0"/>
-              <a:t>el número de mensajes por ronda, agregado y también de acuerdo a experticia </a:t>
-            </a:r>
-            <a:r>
-              <a:rPr lang="es-CO" smtClean="0"/>
-              <a:t>=&gt; </a:t>
-            </a:r>
-            <a:r>
-              <a:rPr lang="es-CO" smtClean="0"/>
-              <a:t>OK</a:t>
-            </a:r>
-            <a:endParaRPr lang="es-CO" dirty="0" smtClean="0"/>
+              <a:t>Graficar el número de mensajes por ronda, agregado y también de acuerdo a experticia =&gt; OK</a:t>
+            </a:r>
           </a:p>
           <a:p>
             <a:r>
@@ -4706,9 +4703,87 @@
           <a:p>
             <a:r>
               <a:rPr lang="es-CO" dirty="0" smtClean="0"/>
-              <a:t>Score in training rounds</a:t>
+              <a:t>Score per round (Training)</a:t>
             </a:r>
             <a:endParaRPr lang="es-CO" dirty="0"/>
+          </a:p>
+        </p:txBody>
+      </p:sp>
+      <p:sp>
+        <p:nvSpPr>
+          <p:cNvPr id="7" name="CuadroTexto 6"/>
+          <p:cNvSpPr txBox="1"/>
+          <p:nvPr/>
+        </p:nvSpPr>
+        <p:spPr>
+          <a:xfrm>
+            <a:off x="1482811" y="5782962"/>
+            <a:ext cx="9813136" cy="923330"/>
+          </a:xfrm>
+          <a:prstGeom prst="rect">
+            <a:avLst/>
+          </a:prstGeom>
+          <a:noFill/>
+        </p:spPr>
+        <p:txBody>
+          <a:bodyPr wrap="none" rtlCol="0">
+            <a:spAutoFit/>
+          </a:bodyPr>
+          <a:lstStyle/>
+          <a:p>
+            <a:pPr marL="285750" indent="-285750">
+              <a:buFont typeface="Arial" panose="020B0604020202020204" pitchFamily="34" charset="0"/>
+              <a:buChar char="•"/>
+            </a:pPr>
+            <a:r>
+              <a:rPr lang="es-CO" dirty="0" smtClean="0"/>
+              <a:t>No hay mucha diferencia entre las condiciones, pero las parejas parecen un poco mejor</a:t>
+            </a:r>
+          </a:p>
+          <a:p>
+            <a:pPr marL="285750" indent="-285750">
+              <a:buFont typeface="Arial" panose="020B0604020202020204" pitchFamily="34" charset="0"/>
+              <a:buChar char="•"/>
+            </a:pPr>
+            <a:r>
+              <a:rPr lang="es-CO" dirty="0" smtClean="0"/>
+              <a:t>No hay mucha diferencia entre las </a:t>
+            </a:r>
+            <a:r>
+              <a:rPr lang="es-CO" dirty="0" err="1" smtClean="0"/>
+              <a:t>experticies</a:t>
+            </a:r>
+            <a:r>
+              <a:rPr lang="es-CO" dirty="0" smtClean="0"/>
+              <a:t>, pero los </a:t>
+            </a:r>
+            <a:r>
+              <a:rPr lang="es-CO" dirty="0" err="1" smtClean="0"/>
+              <a:t>hound</a:t>
+            </a:r>
+            <a:r>
+              <a:rPr lang="es-CO" dirty="0" smtClean="0"/>
+              <a:t> parecen un poco mejor</a:t>
+            </a:r>
+          </a:p>
+          <a:p>
+            <a:pPr marL="285750" indent="-285750">
+              <a:buFont typeface="Arial" panose="020B0604020202020204" pitchFamily="34" charset="0"/>
+              <a:buChar char="•"/>
+            </a:pPr>
+            <a:r>
+              <a:rPr lang="es-CO" dirty="0" smtClean="0"/>
+              <a:t>No hay mucha diferencia entre las clases de perro, pero los </a:t>
+            </a:r>
+            <a:r>
+              <a:rPr lang="es-CO" dirty="0" err="1" smtClean="0"/>
+              <a:t>Cairn</a:t>
+            </a:r>
+            <a:r>
+              <a:rPr lang="es-CO" dirty="0" smtClean="0"/>
+              <a:t> Terrier parece un poco más difíciles</a:t>
+            </a:r>
+            <a:endParaRPr lang="es-CO" dirty="0" smtClean="0"/>
           </a:p>
         </p:txBody>
       </p:sp>
@@ -4728,78 +4803,18 @@
         </p:blipFill>
         <p:spPr>
           <a:xfrm>
-            <a:off x="1680517" y="1395549"/>
-            <a:ext cx="7776521" cy="3884553"/>
+            <a:off x="780535" y="1370461"/>
+            <a:ext cx="10169912" cy="4353786"/>
           </a:xfrm>
           <a:prstGeom prst="rect">
             <a:avLst/>
           </a:prstGeom>
         </p:spPr>
       </p:pic>
-      <p:sp>
-        <p:nvSpPr>
-          <p:cNvPr id="4" name="CuadroTexto 3"/>
-          <p:cNvSpPr txBox="1"/>
-          <p:nvPr/>
-        </p:nvSpPr>
-        <p:spPr>
-          <a:xfrm>
-            <a:off x="1482811" y="5782962"/>
-            <a:ext cx="7625934" cy="646331"/>
-          </a:xfrm>
-          <a:prstGeom prst="rect">
-            <a:avLst/>
-          </a:prstGeom>
-          <a:noFill/>
-        </p:spPr>
-        <p:txBody>
-          <a:bodyPr wrap="none" rtlCol="0">
-            <a:spAutoFit/>
-          </a:bodyPr>
-          <a:lstStyle/>
-          <a:p>
-            <a:pPr marL="285750" indent="-285750">
-              <a:buFont typeface="Arial" panose="020B0604020202020204" pitchFamily="34" charset="0"/>
-              <a:buChar char="•"/>
-            </a:pPr>
-            <a:r>
-              <a:rPr lang="es-CO" dirty="0" smtClean="0"/>
-              <a:t>No se observa diferencia significativa respecto a los grupos y a los individuos</a:t>
-            </a:r>
-          </a:p>
-          <a:p>
-            <a:pPr marL="285750" indent="-285750">
-              <a:buFont typeface="Arial" panose="020B0604020202020204" pitchFamily="34" charset="0"/>
-              <a:buChar char="•"/>
-            </a:pPr>
-            <a:r>
-              <a:rPr lang="es-CO" dirty="0"/>
-              <a:t>No se observa diferencia </a:t>
-            </a:r>
-            <a:r>
-              <a:rPr lang="es-CO" dirty="0" smtClean="0"/>
-              <a:t>significativa respecto a los </a:t>
-            </a:r>
-            <a:r>
-              <a:rPr lang="es-CO" dirty="0" err="1" smtClean="0"/>
-              <a:t>hounds</a:t>
-            </a:r>
-            <a:r>
-              <a:rPr lang="es-CO" dirty="0" smtClean="0"/>
-              <a:t> y a los </a:t>
-            </a:r>
-            <a:r>
-              <a:rPr lang="es-CO" dirty="0" err="1" smtClean="0"/>
-              <a:t>terriers</a:t>
-            </a:r>
-            <a:endParaRPr lang="es-CO" dirty="0"/>
-          </a:p>
-        </p:txBody>
-      </p:sp>
     </p:spTree>
     <p:extLst>
       <p:ext uri="{BB962C8B-B14F-4D97-AF65-F5344CB8AC3E}">
-        <p14:creationId xmlns:p14="http://schemas.microsoft.com/office/powerpoint/2010/main" val="2547698213"/>
+        <p14:creationId xmlns:p14="http://schemas.microsoft.com/office/powerpoint/2010/main" val="370034579"/>
       </p:ext>
     </p:extLst>
   </p:cSld>

</xml_diff>